<commit_message>
Mejoras menores en algunos ejemplos
</commit_message>
<xml_diff>
--- a/Presentaciones/02. Caracteristicas del Lenguaje C#.pptx
+++ b/Presentaciones/02. Caracteristicas del Lenguaje C#.pptx
@@ -260,7 +260,7 @@
             <a:fld id="{9EDD97AB-8915-4450-BB4D-ADC3317B43DD}" type="datetimeFigureOut">
               <a:rPr lang="es-AR" smtClean="0"/>
               <a:pPr/>
-              <a:t>29/03/2014</a:t>
+              <a:t>23/03/2015</a:t>
             </a:fld>
             <a:endParaRPr lang="es-AR"/>
           </a:p>
@@ -427,7 +427,7 @@
             <a:fld id="{747A4859-E260-4AFA-8974-05D8619D18C8}" type="datetimeFigureOut">
               <a:rPr lang="es-AR" smtClean="0"/>
               <a:pPr/>
-              <a:t>29/03/2014</a:t>
+              <a:t>23/03/2015</a:t>
             </a:fld>
             <a:endParaRPr lang="es-AR"/>
           </a:p>
@@ -5082,7 +5082,7 @@
           <a:p>
             <a:fld id="{D837C3BD-9B2E-48F2-9095-8EF3CFEAA59F}" type="datetime1">
               <a:rPr lang="es-ES" smtClean="0"/>
-              <a:t>29/03/2014</a:t>
+              <a:t>23/03/2015</a:t>
             </a:fld>
             <a:endParaRPr lang="es-ES"/>
           </a:p>
@@ -5237,7 +5237,7 @@
           <a:p>
             <a:fld id="{C6C622FA-AF83-496D-85CF-53DD47FDD18C}" type="datetime1">
               <a:rPr lang="es-ES" smtClean="0"/>
-              <a:t>29/03/2014</a:t>
+              <a:t>23/03/2015</a:t>
             </a:fld>
             <a:endParaRPr lang="es-ES"/>
           </a:p>
@@ -5611,7 +5611,7 @@
           <a:p>
             <a:fld id="{BCB2535B-4B85-49C3-8870-70A7B8C54D76}" type="datetime1">
               <a:rPr lang="es-ES" smtClean="0"/>
-              <a:t>29/03/2014</a:t>
+              <a:t>23/03/2015</a:t>
             </a:fld>
             <a:endParaRPr lang="es-AR"/>
           </a:p>
@@ -5768,7 +5768,7 @@
           <a:p>
             <a:fld id="{100AD3AA-E9AE-4916-95E5-B71FD8606470}" type="datetime1">
               <a:rPr lang="es-ES" smtClean="0"/>
-              <a:t>29/03/2014</a:t>
+              <a:t>23/03/2015</a:t>
             </a:fld>
             <a:endParaRPr lang="es-AR"/>
           </a:p>
@@ -7543,7 +7543,7 @@
           <a:p>
             <a:fld id="{7213E5B6-A449-47E6-AD12-BB21C8C5B351}" type="datetime1">
               <a:rPr lang="es-ES" smtClean="0"/>
-              <a:t>29/03/2014</a:t>
+              <a:t>23/03/2015</a:t>
             </a:fld>
             <a:endParaRPr lang="es-ES"/>
           </a:p>
@@ -8207,7 +8207,7 @@
           <a:p>
             <a:fld id="{303F5042-A750-4659-8839-DCB15334682D}" type="datetime1">
               <a:rPr lang="es-ES" smtClean="0"/>
-              <a:t>29/03/2014</a:t>
+              <a:t>23/03/2015</a:t>
             </a:fld>
             <a:endParaRPr lang="es-AR"/>
           </a:p>
@@ -8413,7 +8413,7 @@
           <a:p>
             <a:fld id="{8B84657F-FF95-4C6D-8666-09D4F81BD2B8}" type="datetime1">
               <a:rPr lang="es-ES" smtClean="0"/>
-              <a:t>29/03/2014</a:t>
+              <a:t>23/03/2015</a:t>
             </a:fld>
             <a:endParaRPr lang="es-AR"/>
           </a:p>
@@ -8849,7 +8849,7 @@
           <a:p>
             <a:fld id="{CF8F1886-F23B-46E9-B1E3-A764C927E75F}" type="datetime1">
               <a:rPr lang="es-ES" smtClean="0"/>
-              <a:t>29/03/2014</a:t>
+              <a:t>23/03/2015</a:t>
             </a:fld>
             <a:endParaRPr lang="es-AR"/>
           </a:p>
@@ -9441,7 +9441,7 @@
           <a:p>
             <a:fld id="{5D7F323D-B14E-4A33-8BAF-7351C8C36785}" type="datetime1">
               <a:rPr lang="es-ES" smtClean="0"/>
-              <a:t>29/03/2014</a:t>
+              <a:t>23/03/2015</a:t>
             </a:fld>
             <a:endParaRPr lang="es-AR"/>
           </a:p>
@@ -9795,7 +9795,7 @@
           <a:p>
             <a:fld id="{8F38F8F4-E31E-4722-90FE-76E865B7481C}" type="datetime1">
               <a:rPr lang="es-ES" smtClean="0"/>
-              <a:t>29/03/2014</a:t>
+              <a:t>23/03/2015</a:t>
             </a:fld>
             <a:endParaRPr lang="es-AR"/>
           </a:p>
@@ -10064,7 +10064,7 @@
           <a:p>
             <a:fld id="{C2B9C6C8-5297-4E8D-9DCA-4E74EB572863}" type="datetime1">
               <a:rPr lang="es-ES" smtClean="0"/>
-              <a:t>29/03/2014</a:t>
+              <a:t>23/03/2015</a:t>
             </a:fld>
             <a:endParaRPr lang="es-AR"/>
           </a:p>
@@ -10247,7 +10247,7 @@
           <a:p>
             <a:fld id="{6B506FA7-6BE6-4BDF-BB78-244A1B1564D4}" type="datetime1">
               <a:rPr lang="es-ES" smtClean="0"/>
-              <a:t>29/03/2014</a:t>
+              <a:t>23/03/2015</a:t>
             </a:fld>
             <a:endParaRPr lang="es-AR"/>
           </a:p>
@@ -10680,7 +10680,7 @@
           <a:p>
             <a:fld id="{74AE0577-5487-49EC-82DB-C604529E1DED}" type="datetime1">
               <a:rPr lang="es-ES" smtClean="0"/>
-              <a:t>29/03/2014</a:t>
+              <a:t>23/03/2015</a:t>
             </a:fld>
             <a:endParaRPr lang="es-AR"/>
           </a:p>
@@ -10985,7 +10985,7 @@
           <a:p>
             <a:fld id="{63FF8CD1-5087-49A7-9D44-F9A8A226716D}" type="datetime1">
               <a:rPr lang="es-ES" smtClean="0"/>
-              <a:t>29/03/2014</a:t>
+              <a:t>23/03/2015</a:t>
             </a:fld>
             <a:endParaRPr lang="es-AR"/>
           </a:p>
@@ -11762,7 +11762,7 @@
           <a:p>
             <a:fld id="{9481C012-DF9F-4711-B727-C3E460FEA218}" type="datetime1">
               <a:rPr lang="es-ES" smtClean="0"/>
-              <a:t>29/03/2014</a:t>
+              <a:t>23/03/2015</a:t>
             </a:fld>
             <a:endParaRPr lang="es-AR"/>
           </a:p>
@@ -12656,7 +12656,7 @@
           <a:p>
             <a:fld id="{D74803BD-8545-4904-B322-B5DB0A205166}" type="datetime1">
               <a:rPr lang="es-ES" smtClean="0"/>
-              <a:t>29/03/2014</a:t>
+              <a:t>23/03/2015</a:t>
             </a:fld>
             <a:endParaRPr lang="es-AR"/>
           </a:p>
@@ -12827,7 +12827,7 @@
           <a:p>
             <a:fld id="{3B5C7ECE-173C-4892-846E-F2008894958E}" type="datetime1">
               <a:rPr lang="es-ES" smtClean="0"/>
-              <a:t>29/03/2014</a:t>
+              <a:t>23/03/2015</a:t>
             </a:fld>
             <a:endParaRPr lang="es-AR"/>
           </a:p>
@@ -13201,7 +13201,7 @@
           <a:p>
             <a:fld id="{DE76FC08-44C8-4222-9B87-2BA280302235}" type="datetime1">
               <a:rPr lang="es-ES" smtClean="0"/>
-              <a:t>29/03/2014</a:t>
+              <a:t>23/03/2015</a:t>
             </a:fld>
             <a:endParaRPr lang="es-AR"/>
           </a:p>
@@ -13935,7 +13935,7 @@
           <a:p>
             <a:fld id="{15CCCD02-DA69-46A8-9B3E-3B817704A49E}" type="datetime1">
               <a:rPr lang="es-ES" smtClean="0"/>
-              <a:t>29/03/2014</a:t>
+              <a:t>23/03/2015</a:t>
             </a:fld>
             <a:endParaRPr lang="es-AR"/>
           </a:p>
@@ -14734,7 +14734,7 @@
           <a:p>
             <a:fld id="{FBD1D584-3EBC-47A7-B093-9981336484B2}" type="datetime1">
               <a:rPr lang="es-ES" smtClean="0"/>
-              <a:t>29/03/2014</a:t>
+              <a:t>23/03/2015</a:t>
             </a:fld>
             <a:endParaRPr lang="es-AR"/>
           </a:p>
@@ -15163,7 +15163,7 @@
           <a:p>
             <a:fld id="{883B1876-81BC-4045-BCB4-AF75A862164B}" type="datetime1">
               <a:rPr lang="es-ES" smtClean="0"/>
-              <a:t>29/03/2014</a:t>
+              <a:t>23/03/2015</a:t>
             </a:fld>
             <a:endParaRPr lang="es-AR"/>
           </a:p>
@@ -15613,7 +15613,7 @@
           <a:p>
             <a:fld id="{7B931BDB-D443-49C2-B2F9-384EA48816DE}" type="datetime1">
               <a:rPr lang="es-ES" smtClean="0"/>
-              <a:t>29/03/2014</a:t>
+              <a:t>23/03/2015</a:t>
             </a:fld>
             <a:endParaRPr lang="es-AR" dirty="0"/>
           </a:p>
@@ -16564,7 +16564,7 @@
           <a:p>
             <a:fld id="{846E9EF9-D6A0-4106-BB8F-420359F768C5}" type="datetime1">
               <a:rPr lang="es-ES" smtClean="0"/>
-              <a:t>29/03/2014</a:t>
+              <a:t>23/03/2015</a:t>
             </a:fld>
             <a:endParaRPr lang="es-AR"/>
           </a:p>
@@ -16855,7 +16855,7 @@
           <a:p>
             <a:fld id="{418E658D-D550-4378-B9F1-AD66C90A1830}" type="datetime1">
               <a:rPr lang="es-ES" smtClean="0"/>
-              <a:t>29/03/2014</a:t>
+              <a:t>23/03/2015</a:t>
             </a:fld>
             <a:endParaRPr lang="es-AR"/>
           </a:p>
@@ -17098,7 +17098,7 @@
           <a:p>
             <a:fld id="{BA4E9A5C-D4D7-4DB3-B927-6C4CCD5EBE03}" type="datetime1">
               <a:rPr lang="es-ES" smtClean="0"/>
-              <a:t>29/03/2014</a:t>
+              <a:t>23/03/2015</a:t>
             </a:fld>
             <a:endParaRPr lang="es-AR"/>
           </a:p>
@@ -17478,7 +17478,7 @@
           <a:p>
             <a:fld id="{9E87E6C0-E44A-4DC7-BB63-90F8F9657436}" type="datetime1">
               <a:rPr lang="es-ES" smtClean="0"/>
-              <a:t>29/03/2014</a:t>
+              <a:t>23/03/2015</a:t>
             </a:fld>
             <a:endParaRPr lang="es-AR"/>
           </a:p>
@@ -17996,7 +17996,7 @@
           <a:p>
             <a:fld id="{513D9849-A8BA-4C3D-A639-169435D75E22}" type="datetime1">
               <a:rPr lang="es-ES" smtClean="0"/>
-              <a:t>29/03/2014</a:t>
+              <a:t>23/03/2015</a:t>
             </a:fld>
             <a:endParaRPr lang="es-ES"/>
           </a:p>
@@ -18064,7 +18064,11 @@
           <a:bodyPr/>
           <a:lstStyle/>
           <a:p>
-            <a:endParaRPr lang="es-AR"/>
+            <a:r>
+              <a:rPr lang="es-ES_tradnl" dirty="0" smtClean="0"/>
+              <a:t>Sistema de Tipos</a:t>
+            </a:r>
+            <a:endParaRPr lang="es-AR" dirty="0"/>
           </a:p>
         </p:txBody>
       </p:sp>
@@ -18260,7 +18264,7 @@
           <a:p>
             <a:fld id="{5519114C-6A88-4315-9215-982DA530DE9B}" type="datetime1">
               <a:rPr lang="es-ES" smtClean="0"/>
-              <a:t>29/03/2014</a:t>
+              <a:t>23/03/2015</a:t>
             </a:fld>
             <a:endParaRPr lang="es-AR"/>
           </a:p>
@@ -18426,7 +18430,7 @@
           <a:p>
             <a:fld id="{3B65F2BB-9279-436C-90A9-1AFD87324DAE}" type="datetime1">
               <a:rPr lang="es-ES" smtClean="0"/>
-              <a:t>29/03/2014</a:t>
+              <a:t>23/03/2015</a:t>
             </a:fld>
             <a:endParaRPr lang="es-AR"/>
           </a:p>
@@ -19202,7 +19206,7 @@
           <a:p>
             <a:fld id="{FDB1B4E3-88EB-4D81-90A2-8029CA82D329}" type="datetime1">
               <a:rPr lang="es-ES" smtClean="0"/>
-              <a:t>29/03/2014</a:t>
+              <a:t>23/03/2015</a:t>
             </a:fld>
             <a:endParaRPr lang="es-AR"/>
           </a:p>
@@ -19654,7 +19658,7 @@
           <a:p>
             <a:fld id="{C6C622FA-AF83-496D-85CF-53DD47FDD18C}" type="datetime1">
               <a:rPr lang="es-ES" smtClean="0"/>
-              <a:t>29/03/2014</a:t>
+              <a:t>23/03/2015</a:t>
             </a:fld>
             <a:endParaRPr lang="es-ES"/>
           </a:p>
@@ -19822,7 +19826,7 @@
           <a:p>
             <a:fld id="{C6C622FA-AF83-496D-85CF-53DD47FDD18C}" type="datetime1">
               <a:rPr lang="es-ES" smtClean="0"/>
-              <a:t>29/03/2014</a:t>
+              <a:t>23/03/2015</a:t>
             </a:fld>
             <a:endParaRPr lang="es-ES" dirty="0"/>
           </a:p>
@@ -20566,7 +20570,7 @@
           <a:p>
             <a:fld id="{EACB1D56-5547-4BF0-995E-62CA92ABC56F}" type="datetime1">
               <a:rPr lang="es-ES" smtClean="0"/>
-              <a:t>29/03/2014</a:t>
+              <a:t>23/03/2015</a:t>
             </a:fld>
             <a:endParaRPr lang="es-AR"/>
           </a:p>
@@ -20765,7 +20769,7 @@
           <a:p>
             <a:fld id="{E8C984B4-B708-4DF7-985F-B6A7B59CB069}" type="datetime1">
               <a:rPr lang="es-ES" smtClean="0"/>
-              <a:t>29/03/2014</a:t>
+              <a:t>23/03/2015</a:t>
             </a:fld>
             <a:endParaRPr lang="es-AR"/>
           </a:p>
@@ -20816,7 +20820,7 @@
           <a:lstStyle/>
           <a:p>
             <a:r>
-              <a:rPr lang="es-AR" dirty="0"/>
+              <a:rPr lang="es-AR" b="0" dirty="0"/>
               <a:t>El Sistema de Tipos - Tipos Primitivos</a:t>
             </a:r>
           </a:p>
@@ -21362,7 +21366,7 @@
           <a:p>
             <a:fld id="{BA411D31-098D-4FE2-9180-FBB16F0DFBF4}" type="datetime1">
               <a:rPr lang="es-ES" smtClean="0"/>
-              <a:t>29/03/2014</a:t>
+              <a:t>23/03/2015</a:t>
             </a:fld>
             <a:endParaRPr lang="es-AR"/>
           </a:p>
@@ -23185,7 +23189,7 @@
           <a:p>
             <a:fld id="{EF31D7CF-F435-4D3F-A0AA-4AEFAD35563F}" type="datetime1">
               <a:rPr lang="es-ES" smtClean="0"/>
-              <a:t>29/03/2014</a:t>
+              <a:t>23/03/2015</a:t>
             </a:fld>
             <a:endParaRPr lang="es-AR"/>
           </a:p>
@@ -23241,8 +23245,8 @@
               <a:t>– Tipos </a:t>
             </a:r>
             <a:r>
-              <a:rPr lang="es-AR" dirty="0" err="1" smtClean="0"/>
-              <a:t>Primitios</a:t>
+              <a:rPr lang="es-AR" dirty="0" smtClean="0"/>
+              <a:t>Primitivos</a:t>
             </a:r>
             <a:endParaRPr lang="es-AR" dirty="0"/>
           </a:p>
@@ -25141,7 +25145,7 @@
           <a:p>
             <a:fld id="{6EA676D4-078B-45B8-835A-986B8DC9222A}" type="datetime1">
               <a:rPr lang="es-ES" smtClean="0"/>
-              <a:t>29/03/2014</a:t>
+              <a:t>23/03/2015</a:t>
             </a:fld>
             <a:endParaRPr lang="es-AR"/>
           </a:p>
@@ -27465,7 +27469,7 @@
           <a:p>
             <a:fld id="{5950D093-BE9E-4000-8A11-BF664B3D337B}" type="datetime1">
               <a:rPr lang="es-ES" smtClean="0"/>
-              <a:t>29/03/2014</a:t>
+              <a:t>23/03/2015</a:t>
             </a:fld>
             <a:endParaRPr lang="es-AR"/>
           </a:p>
@@ -28086,7 +28090,7 @@
           <a:p>
             <a:fld id="{E5FA0C64-5A60-459E-92CB-5ECBDD2344AC}" type="datetime1">
               <a:rPr lang="es-ES" smtClean="0"/>
-              <a:t>29/03/2014</a:t>
+              <a:t>23/03/2015</a:t>
             </a:fld>
             <a:endParaRPr lang="es-AR" dirty="0"/>
           </a:p>

</xml_diff>